<commit_message>
Word CLound, Bigram and Trigram
</commit_message>
<xml_diff>
--- a/Topic Modelling.pptx
+++ b/Topic Modelling.pptx
@@ -9,6 +9,7 @@
     <p:sldId id="257" r:id="rId3"/>
     <p:sldId id="258" r:id="rId4"/>
     <p:sldId id="259" r:id="rId5"/>
+    <p:sldId id="260" r:id="rId6"/>
   </p:sldIdLst>
   <p:sldSz cx="12192000" cy="6858000"/>
   <p:notesSz cx="6858000" cy="9144000"/>
@@ -107,6 +108,11 @@
       </a:defRPr>
     </a:lvl9pPr>
   </p:defaultTextStyle>
+  <p:extLst>
+    <p:ext uri="{EFAFB233-063F-42B5-8137-9DF3F51BA10A}">
+      <p15:sldGuideLst xmlns:p15="http://schemas.microsoft.com/office/powerpoint/2012/main"/>
+    </p:ext>
+  </p:extLst>
 </p:presentation>
 </file>
 
@@ -299,7 +305,7 @@
             <a:fld id="{B61BEF0D-F0BB-DE4B-95CE-6DB70DBA9567}" type="datetimeFigureOut">
               <a:rPr lang="en-US" dirty="0"/>
               <a:pPr/>
-              <a:t>7/30/2019</a:t>
+              <a:t>8/1/2019</a:t>
             </a:fld>
             <a:endParaRPr lang="en-US" dirty="0"/>
           </a:p>
@@ -634,7 +640,7 @@
             <a:fld id="{B61BEF0D-F0BB-DE4B-95CE-6DB70DBA9567}" type="datetimeFigureOut">
               <a:rPr lang="en-US" dirty="0"/>
               <a:pPr/>
-              <a:t>7/30/2019</a:t>
+              <a:t>8/1/2019</a:t>
             </a:fld>
             <a:endParaRPr lang="en-US" dirty="0"/>
           </a:p>
@@ -1032,7 +1038,7 @@
             <a:fld id="{B61BEF0D-F0BB-DE4B-95CE-6DB70DBA9567}" type="datetimeFigureOut">
               <a:rPr lang="en-US" dirty="0"/>
               <a:pPr/>
-              <a:t>7/30/2019</a:t>
+              <a:t>8/1/2019</a:t>
             </a:fld>
             <a:endParaRPr lang="en-US" dirty="0"/>
           </a:p>
@@ -1365,7 +1371,7 @@
             <a:fld id="{B61BEF0D-F0BB-DE4B-95CE-6DB70DBA9567}" type="datetimeFigureOut">
               <a:rPr lang="en-US" dirty="0"/>
               <a:pPr/>
-              <a:t>7/30/2019</a:t>
+              <a:t>8/1/2019</a:t>
             </a:fld>
             <a:endParaRPr lang="en-US" dirty="0"/>
           </a:p>
@@ -1682,7 +1688,7 @@
             <a:fld id="{B61BEF0D-F0BB-DE4B-95CE-6DB70DBA9567}" type="datetimeFigureOut">
               <a:rPr lang="en-US" dirty="0"/>
               <a:pPr/>
-              <a:t>7/30/2019</a:t>
+              <a:t>8/1/2019</a:t>
             </a:fld>
             <a:endParaRPr lang="en-US" dirty="0"/>
           </a:p>
@@ -2075,7 +2081,7 @@
             <a:fld id="{B61BEF0D-F0BB-DE4B-95CE-6DB70DBA9567}" type="datetimeFigureOut">
               <a:rPr lang="en-US" dirty="0"/>
               <a:pPr/>
-              <a:t>7/30/2019</a:t>
+              <a:t>8/1/2019</a:t>
             </a:fld>
             <a:endParaRPr lang="en-US" dirty="0"/>
           </a:p>
@@ -2329,7 +2335,7 @@
             <a:fld id="{B61BEF0D-F0BB-DE4B-95CE-6DB70DBA9567}" type="datetimeFigureOut">
               <a:rPr lang="en-US" dirty="0"/>
               <a:pPr/>
-              <a:t>7/30/2019</a:t>
+              <a:t>8/1/2019</a:t>
             </a:fld>
             <a:endParaRPr lang="en-US" dirty="0"/>
           </a:p>
@@ -2588,7 +2594,7 @@
             <a:fld id="{B61BEF0D-F0BB-DE4B-95CE-6DB70DBA9567}" type="datetimeFigureOut">
               <a:rPr lang="en-US" dirty="0"/>
               <a:pPr/>
-              <a:t>7/30/2019</a:t>
+              <a:t>8/1/2019</a:t>
             </a:fld>
             <a:endParaRPr lang="en-US" dirty="0"/>
           </a:p>
@@ -2847,7 +2853,7 @@
             <a:fld id="{B61BEF0D-F0BB-DE4B-95CE-6DB70DBA9567}" type="datetimeFigureOut">
               <a:rPr lang="en-US" dirty="0"/>
               <a:pPr/>
-              <a:t>7/30/2019</a:t>
+              <a:t>8/1/2019</a:t>
             </a:fld>
             <a:endParaRPr lang="en-US" dirty="0"/>
           </a:p>
@@ -3173,7 +3179,7 @@
             <a:fld id="{B61BEF0D-F0BB-DE4B-95CE-6DB70DBA9567}" type="datetimeFigureOut">
               <a:rPr lang="en-US" dirty="0"/>
               <a:pPr/>
-              <a:t>7/30/2019</a:t>
+              <a:t>8/1/2019</a:t>
             </a:fld>
             <a:endParaRPr lang="en-US" dirty="0"/>
           </a:p>
@@ -3493,7 +3499,7 @@
             <a:fld id="{B61BEF0D-F0BB-DE4B-95CE-6DB70DBA9567}" type="datetimeFigureOut">
               <a:rPr lang="en-US" dirty="0"/>
               <a:pPr/>
-              <a:t>7/30/2019</a:t>
+              <a:t>8/1/2019</a:t>
             </a:fld>
             <a:endParaRPr lang="en-US" dirty="0"/>
           </a:p>
@@ -3947,7 +3953,7 @@
             <a:fld id="{B61BEF0D-F0BB-DE4B-95CE-6DB70DBA9567}" type="datetimeFigureOut">
               <a:rPr lang="en-US" dirty="0"/>
               <a:pPr/>
-              <a:t>7/30/2019</a:t>
+              <a:t>8/1/2019</a:t>
             </a:fld>
             <a:endParaRPr lang="en-US" dirty="0"/>
           </a:p>
@@ -4149,7 +4155,7 @@
             <a:fld id="{B61BEF0D-F0BB-DE4B-95CE-6DB70DBA9567}" type="datetimeFigureOut">
               <a:rPr lang="en-US" dirty="0"/>
               <a:pPr/>
-              <a:t>7/30/2019</a:t>
+              <a:t>8/1/2019</a:t>
             </a:fld>
             <a:endParaRPr lang="en-US" dirty="0"/>
           </a:p>
@@ -4323,7 +4329,7 @@
             <a:fld id="{B61BEF0D-F0BB-DE4B-95CE-6DB70DBA9567}" type="datetimeFigureOut">
               <a:rPr lang="en-US" dirty="0"/>
               <a:pPr/>
-              <a:t>7/30/2019</a:t>
+              <a:t>8/1/2019</a:t>
             </a:fld>
             <a:endParaRPr lang="en-US" dirty="0"/>
           </a:p>
@@ -4653,7 +4659,7 @@
             <a:fld id="{B61BEF0D-F0BB-DE4B-95CE-6DB70DBA9567}" type="datetimeFigureOut">
               <a:rPr lang="en-US" dirty="0"/>
               <a:pPr/>
-              <a:t>7/30/2019</a:t>
+              <a:t>8/1/2019</a:t>
             </a:fld>
             <a:endParaRPr lang="en-US" dirty="0"/>
           </a:p>
@@ -4995,7 +5001,7 @@
             <a:fld id="{B61BEF0D-F0BB-DE4B-95CE-6DB70DBA9567}" type="datetimeFigureOut">
               <a:rPr lang="en-US" dirty="0"/>
               <a:pPr/>
-              <a:t>7/30/2019</a:t>
+              <a:t>8/1/2019</a:t>
             </a:fld>
             <a:endParaRPr lang="en-US" dirty="0"/>
           </a:p>
@@ -7109,7 +7115,7 @@
             <a:fld id="{B61BEF0D-F0BB-DE4B-95CE-6DB70DBA9567}" type="datetimeFigureOut">
               <a:rPr lang="en-US" dirty="0"/>
               <a:pPr/>
-              <a:t>7/30/2019</a:t>
+              <a:t>8/1/2019</a:t>
             </a:fld>
             <a:endParaRPr lang="en-US" dirty="0"/>
           </a:p>
@@ -8706,8 +8712,8 @@
           </a:p>
         </p:txBody>
       </p:sp>
-      <mc:AlternateContent xmlns:mc="http://schemas.openxmlformats.org/markup-compatibility/2006">
-        <mc:Choice xmlns:a14="http://schemas.microsoft.com/office/drawing/2010/main" Requires="a14">
+      <mc:AlternateContent xmlns:mc="http://schemas.openxmlformats.org/markup-compatibility/2006" xmlns:a14="http://schemas.microsoft.com/office/drawing/2010/main">
+        <mc:Choice Requires="a14">
           <p:sp>
             <p:nvSpPr>
               <p:cNvPr id="3" name="Content Placeholder 2"/>
@@ -8932,7 +8938,7 @@
             </p:txBody>
           </p:sp>
         </mc:Choice>
-        <mc:Fallback>
+        <mc:Fallback xmlns="">
           <p:sp>
             <p:nvSpPr>
               <p:cNvPr id="3" name="Content Placeholder 2"/>
@@ -9167,6 +9173,568 @@
     <p:tnLst>
       <p:par>
         <p:cTn id="1" dur="indefinite" restart="never" nodeType="tmRoot"/>
+      </p:par>
+    </p:tnLst>
+  </p:timing>
+</p:sld>
+</file>
+
+<file path=ppt/slides/slide5.xml><?xml version="1.0" encoding="utf-8"?>
+<p:sld xmlns:a="http://schemas.openxmlformats.org/drawingml/2006/main" xmlns:r="http://schemas.openxmlformats.org/officeDocument/2006/relationships" xmlns:p="http://schemas.openxmlformats.org/presentationml/2006/main">
+  <p:cSld>
+    <p:spTree>
+      <p:nvGrpSpPr>
+        <p:cNvPr id="1" name=""/>
+        <p:cNvGrpSpPr/>
+        <p:nvPr/>
+      </p:nvGrpSpPr>
+      <p:grpSpPr>
+        <a:xfrm>
+          <a:off x="0" y="0"/>
+          <a:ext cx="0" cy="0"/>
+          <a:chOff x="0" y="0"/>
+          <a:chExt cx="0" cy="0"/>
+        </a:xfrm>
+      </p:grpSpPr>
+      <p:sp>
+        <p:nvSpPr>
+          <p:cNvPr id="2" name="Title 1"/>
+          <p:cNvSpPr>
+            <a:spLocks noGrp="1"/>
+          </p:cNvSpPr>
+          <p:nvPr>
+            <p:ph type="title"/>
+          </p:nvPr>
+        </p:nvSpPr>
+        <p:spPr>
+          <a:xfrm>
+            <a:off x="1752666" y="640585"/>
+            <a:ext cx="8911687" cy="545663"/>
+          </a:xfrm>
+        </p:spPr>
+        <p:txBody>
+          <a:bodyPr>
+            <a:normAutofit fontScale="90000"/>
+          </a:bodyPr>
+          <a:lstStyle/>
+          <a:p>
+            <a:r>
+              <a:rPr lang="en-US" dirty="0" smtClean="0"/>
+              <a:t>Topic Modelling</a:t>
+            </a:r>
+            <a:endParaRPr lang="de-DE" dirty="0"/>
+          </a:p>
+        </p:txBody>
+      </p:sp>
+      <p:sp>
+        <p:nvSpPr>
+          <p:cNvPr id="3" name="Content Placeholder 2"/>
+          <p:cNvSpPr>
+            <a:spLocks noGrp="1"/>
+          </p:cNvSpPr>
+          <p:nvPr>
+            <p:ph idx="1"/>
+          </p:nvPr>
+        </p:nvSpPr>
+        <p:spPr>
+          <a:xfrm>
+            <a:off x="1752666" y="1482810"/>
+            <a:ext cx="10332242" cy="5222789"/>
+          </a:xfrm>
+        </p:spPr>
+        <p:txBody>
+          <a:bodyPr>
+            <a:normAutofit/>
+          </a:bodyPr>
+          <a:lstStyle/>
+          <a:p>
+            <a:r>
+              <a:rPr lang="en-US" dirty="0" smtClean="0"/>
+              <a:t>Understanding Results</a:t>
+            </a:r>
+            <a:endParaRPr lang="en-US" dirty="0" smtClean="0"/>
+          </a:p>
+          <a:p>
+            <a:pPr lvl="1"/>
+            <a:r>
+              <a:rPr lang="en-US" dirty="0" smtClean="0"/>
+              <a:t>Topic Visualization: Topics, Keyword Association, Dominant Keywords / Topic</a:t>
+            </a:r>
+            <a:endParaRPr lang="en-US" dirty="0" smtClean="0"/>
+          </a:p>
+          <a:p>
+            <a:pPr lvl="1"/>
+            <a:r>
+              <a:rPr lang="en-US" dirty="0" smtClean="0"/>
+              <a:t>Bigrams &amp; Trigrams</a:t>
+            </a:r>
+            <a:endParaRPr lang="en-US" dirty="0" smtClean="0"/>
+          </a:p>
+          <a:p>
+            <a:pPr lvl="1"/>
+            <a:r>
+              <a:rPr lang="en-US" dirty="0" smtClean="0"/>
+              <a:t>Word Clouds</a:t>
+            </a:r>
+            <a:endParaRPr lang="en-US" b="0" dirty="0" smtClean="0">
+              <a:solidFill>
+                <a:srgbClr val="FF0000"/>
+              </a:solidFill>
+            </a:endParaRPr>
+          </a:p>
+        </p:txBody>
+      </p:sp>
+      <p:pic>
+        <p:nvPicPr>
+          <p:cNvPr id="4" name="Picture 3"/>
+          <p:cNvPicPr>
+            <a:picLocks noChangeAspect="1"/>
+          </p:cNvPicPr>
+          <p:nvPr/>
+        </p:nvPicPr>
+        <p:blipFill>
+          <a:blip r:embed="rId2">
+            <a:extLst>
+              <a:ext uri="{28A0092B-C50C-407E-A947-70E740481C1C}">
+                <a14:useLocalDpi xmlns:a14="http://schemas.microsoft.com/office/drawing/2010/main" val="0"/>
+              </a:ext>
+            </a:extLst>
+          </a:blip>
+          <a:stretch>
+            <a:fillRect/>
+          </a:stretch>
+        </p:blipFill>
+        <p:spPr>
+          <a:xfrm>
+            <a:off x="2257167" y="3171566"/>
+            <a:ext cx="4324865" cy="3243649"/>
+          </a:xfrm>
+          <a:prstGeom prst="rect">
+            <a:avLst/>
+          </a:prstGeom>
+        </p:spPr>
+      </p:pic>
+      <p:pic>
+        <p:nvPicPr>
+          <p:cNvPr id="5" name="Picture 4"/>
+          <p:cNvPicPr>
+            <a:picLocks noChangeAspect="1"/>
+          </p:cNvPicPr>
+          <p:nvPr/>
+        </p:nvPicPr>
+        <p:blipFill>
+          <a:blip r:embed="rId3">
+            <a:extLst>
+              <a:ext uri="{28A0092B-C50C-407E-A947-70E740481C1C}">
+                <a14:useLocalDpi xmlns:a14="http://schemas.microsoft.com/office/drawing/2010/main" val="0"/>
+              </a:ext>
+            </a:extLst>
+          </a:blip>
+          <a:stretch>
+            <a:fillRect/>
+          </a:stretch>
+        </p:blipFill>
+        <p:spPr>
+          <a:xfrm>
+            <a:off x="7361878" y="3171566"/>
+            <a:ext cx="4253473" cy="3243649"/>
+          </a:xfrm>
+          <a:prstGeom prst="rect">
+            <a:avLst/>
+          </a:prstGeom>
+        </p:spPr>
+      </p:pic>
+      <p:pic>
+        <p:nvPicPr>
+          <p:cNvPr id="6" name="Picture 5"/>
+          <p:cNvPicPr>
+            <a:picLocks noChangeAspect="1"/>
+          </p:cNvPicPr>
+          <p:nvPr/>
+        </p:nvPicPr>
+        <p:blipFill>
+          <a:blip r:embed="rId4">
+            <a:extLst>
+              <a:ext uri="{28A0092B-C50C-407E-A947-70E740481C1C}">
+                <a14:useLocalDpi xmlns:a14="http://schemas.microsoft.com/office/drawing/2010/main" val="0"/>
+              </a:ext>
+            </a:extLst>
+          </a:blip>
+          <a:stretch>
+            <a:fillRect/>
+          </a:stretch>
+        </p:blipFill>
+        <p:spPr>
+          <a:xfrm>
+            <a:off x="4864902" y="2331308"/>
+            <a:ext cx="5493001" cy="4160108"/>
+          </a:xfrm>
+          <a:prstGeom prst="rect">
+            <a:avLst/>
+          </a:prstGeom>
+        </p:spPr>
+      </p:pic>
+    </p:spTree>
+    <p:extLst>
+      <p:ext uri="{BB962C8B-B14F-4D97-AF65-F5344CB8AC3E}">
+        <p14:creationId xmlns:p14="http://schemas.microsoft.com/office/powerpoint/2010/main" val="1528400707"/>
+      </p:ext>
+    </p:extLst>
+  </p:cSld>
+  <p:clrMapOvr>
+    <a:masterClrMapping/>
+  </p:clrMapOvr>
+  <p:timing>
+    <p:tnLst>
+      <p:par>
+        <p:cTn id="1" dur="indefinite" restart="never" nodeType="tmRoot">
+          <p:childTnLst>
+            <p:seq concurrent="1" nextAc="seek">
+              <p:cTn id="2" dur="indefinite" nodeType="mainSeq">
+                <p:childTnLst>
+                  <p:par>
+                    <p:cTn id="3" fill="hold">
+                      <p:stCondLst>
+                        <p:cond delay="indefinite"/>
+                      </p:stCondLst>
+                      <p:childTnLst>
+                        <p:par>
+                          <p:cTn id="4" fill="hold">
+                            <p:stCondLst>
+                              <p:cond delay="0"/>
+                            </p:stCondLst>
+                            <p:childTnLst>
+                              <p:par>
+                                <p:cTn id="5" presetID="10" presetClass="entr" presetSubtype="0" fill="hold" nodeType="clickEffect">
+                                  <p:stCondLst>
+                                    <p:cond delay="0"/>
+                                  </p:stCondLst>
+                                  <p:childTnLst>
+                                    <p:set>
+                                      <p:cBhvr>
+                                        <p:cTn id="6" dur="1" fill="hold">
+                                          <p:stCondLst>
+                                            <p:cond delay="0"/>
+                                          </p:stCondLst>
+                                        </p:cTn>
+                                        <p:tgtEl>
+                                          <p:spTgt spid="3">
+                                            <p:txEl>
+                                              <p:pRg st="1" end="1"/>
+                                            </p:txEl>
+                                          </p:spTgt>
+                                        </p:tgtEl>
+                                        <p:attrNameLst>
+                                          <p:attrName>style.visibility</p:attrName>
+                                        </p:attrNameLst>
+                                      </p:cBhvr>
+                                      <p:to>
+                                        <p:strVal val="visible"/>
+                                      </p:to>
+                                    </p:set>
+                                    <p:animEffect transition="in" filter="fade">
+                                      <p:cBhvr>
+                                        <p:cTn id="7" dur="500"/>
+                                        <p:tgtEl>
+                                          <p:spTgt spid="3">
+                                            <p:txEl>
+                                              <p:pRg st="1" end="1"/>
+                                            </p:txEl>
+                                          </p:spTgt>
+                                        </p:tgtEl>
+                                      </p:cBhvr>
+                                    </p:animEffect>
+                                  </p:childTnLst>
+                                </p:cTn>
+                              </p:par>
+                            </p:childTnLst>
+                          </p:cTn>
+                        </p:par>
+                      </p:childTnLst>
+                    </p:cTn>
+                  </p:par>
+                  <p:par>
+                    <p:cTn id="8" fill="hold">
+                      <p:stCondLst>
+                        <p:cond delay="indefinite"/>
+                      </p:stCondLst>
+                      <p:childTnLst>
+                        <p:par>
+                          <p:cTn id="9" fill="hold">
+                            <p:stCondLst>
+                              <p:cond delay="0"/>
+                            </p:stCondLst>
+                            <p:childTnLst>
+                              <p:par>
+                                <p:cTn id="10" presetID="10" presetClass="entr" presetSubtype="0" fill="hold" nodeType="clickEffect">
+                                  <p:stCondLst>
+                                    <p:cond delay="0"/>
+                                  </p:stCondLst>
+                                  <p:childTnLst>
+                                    <p:set>
+                                      <p:cBhvr>
+                                        <p:cTn id="11" dur="1" fill="hold">
+                                          <p:stCondLst>
+                                            <p:cond delay="0"/>
+                                          </p:stCondLst>
+                                        </p:cTn>
+                                        <p:tgtEl>
+                                          <p:spTgt spid="3">
+                                            <p:txEl>
+                                              <p:pRg st="2" end="2"/>
+                                            </p:txEl>
+                                          </p:spTgt>
+                                        </p:tgtEl>
+                                        <p:attrNameLst>
+                                          <p:attrName>style.visibility</p:attrName>
+                                        </p:attrNameLst>
+                                      </p:cBhvr>
+                                      <p:to>
+                                        <p:strVal val="visible"/>
+                                      </p:to>
+                                    </p:set>
+                                    <p:animEffect transition="in" filter="fade">
+                                      <p:cBhvr>
+                                        <p:cTn id="12" dur="500"/>
+                                        <p:tgtEl>
+                                          <p:spTgt spid="3">
+                                            <p:txEl>
+                                              <p:pRg st="2" end="2"/>
+                                            </p:txEl>
+                                          </p:spTgt>
+                                        </p:tgtEl>
+                                      </p:cBhvr>
+                                    </p:animEffect>
+                                  </p:childTnLst>
+                                </p:cTn>
+                              </p:par>
+                            </p:childTnLst>
+                          </p:cTn>
+                        </p:par>
+                      </p:childTnLst>
+                    </p:cTn>
+                  </p:par>
+                  <p:par>
+                    <p:cTn id="13" fill="hold">
+                      <p:stCondLst>
+                        <p:cond delay="indefinite"/>
+                      </p:stCondLst>
+                      <p:childTnLst>
+                        <p:par>
+                          <p:cTn id="14" fill="hold">
+                            <p:stCondLst>
+                              <p:cond delay="0"/>
+                            </p:stCondLst>
+                            <p:childTnLst>
+                              <p:par>
+                                <p:cTn id="15" presetID="10" presetClass="entr" presetSubtype="0" fill="hold" nodeType="clickEffect">
+                                  <p:stCondLst>
+                                    <p:cond delay="0"/>
+                                  </p:stCondLst>
+                                  <p:childTnLst>
+                                    <p:set>
+                                      <p:cBhvr>
+                                        <p:cTn id="16" dur="1" fill="hold">
+                                          <p:stCondLst>
+                                            <p:cond delay="0"/>
+                                          </p:stCondLst>
+                                        </p:cTn>
+                                        <p:tgtEl>
+                                          <p:spTgt spid="4"/>
+                                        </p:tgtEl>
+                                        <p:attrNameLst>
+                                          <p:attrName>style.visibility</p:attrName>
+                                        </p:attrNameLst>
+                                      </p:cBhvr>
+                                      <p:to>
+                                        <p:strVal val="visible"/>
+                                      </p:to>
+                                    </p:set>
+                                    <p:animEffect transition="in" filter="fade">
+                                      <p:cBhvr>
+                                        <p:cTn id="17" dur="500"/>
+                                        <p:tgtEl>
+                                          <p:spTgt spid="4"/>
+                                        </p:tgtEl>
+                                      </p:cBhvr>
+                                    </p:animEffect>
+                                  </p:childTnLst>
+                                </p:cTn>
+                              </p:par>
+                              <p:par>
+                                <p:cTn id="18" presetID="10" presetClass="entr" presetSubtype="0" fill="hold" nodeType="withEffect">
+                                  <p:stCondLst>
+                                    <p:cond delay="0"/>
+                                  </p:stCondLst>
+                                  <p:childTnLst>
+                                    <p:set>
+                                      <p:cBhvr>
+                                        <p:cTn id="19" dur="1" fill="hold">
+                                          <p:stCondLst>
+                                            <p:cond delay="0"/>
+                                          </p:stCondLst>
+                                        </p:cTn>
+                                        <p:tgtEl>
+                                          <p:spTgt spid="5"/>
+                                        </p:tgtEl>
+                                        <p:attrNameLst>
+                                          <p:attrName>style.visibility</p:attrName>
+                                        </p:attrNameLst>
+                                      </p:cBhvr>
+                                      <p:to>
+                                        <p:strVal val="visible"/>
+                                      </p:to>
+                                    </p:set>
+                                    <p:animEffect transition="in" filter="fade">
+                                      <p:cBhvr>
+                                        <p:cTn id="20" dur="500"/>
+                                        <p:tgtEl>
+                                          <p:spTgt spid="5"/>
+                                        </p:tgtEl>
+                                      </p:cBhvr>
+                                    </p:animEffect>
+                                  </p:childTnLst>
+                                </p:cTn>
+                              </p:par>
+                            </p:childTnLst>
+                          </p:cTn>
+                        </p:par>
+                      </p:childTnLst>
+                    </p:cTn>
+                  </p:par>
+                  <p:par>
+                    <p:cTn id="21" fill="hold">
+                      <p:stCondLst>
+                        <p:cond delay="indefinite"/>
+                      </p:stCondLst>
+                      <p:childTnLst>
+                        <p:par>
+                          <p:cTn id="22" fill="hold">
+                            <p:stCondLst>
+                              <p:cond delay="0"/>
+                            </p:stCondLst>
+                            <p:childTnLst>
+                              <p:par>
+                                <p:cTn id="23" presetID="10" presetClass="entr" presetSubtype="0" fill="hold" nodeType="clickEffect">
+                                  <p:stCondLst>
+                                    <p:cond delay="0"/>
+                                  </p:stCondLst>
+                                  <p:childTnLst>
+                                    <p:set>
+                                      <p:cBhvr>
+                                        <p:cTn id="24" dur="1" fill="hold">
+                                          <p:stCondLst>
+                                            <p:cond delay="0"/>
+                                          </p:stCondLst>
+                                        </p:cTn>
+                                        <p:tgtEl>
+                                          <p:spTgt spid="3">
+                                            <p:txEl>
+                                              <p:pRg st="3" end="3"/>
+                                            </p:txEl>
+                                          </p:spTgt>
+                                        </p:tgtEl>
+                                        <p:attrNameLst>
+                                          <p:attrName>style.visibility</p:attrName>
+                                        </p:attrNameLst>
+                                      </p:cBhvr>
+                                      <p:to>
+                                        <p:strVal val="visible"/>
+                                      </p:to>
+                                    </p:set>
+                                    <p:animEffect transition="in" filter="fade">
+                                      <p:cBhvr>
+                                        <p:cTn id="25" dur="500"/>
+                                        <p:tgtEl>
+                                          <p:spTgt spid="3">
+                                            <p:txEl>
+                                              <p:pRg st="3" end="3"/>
+                                            </p:txEl>
+                                          </p:spTgt>
+                                        </p:tgtEl>
+                                      </p:cBhvr>
+                                    </p:animEffect>
+                                  </p:childTnLst>
+                                </p:cTn>
+                              </p:par>
+                            </p:childTnLst>
+                          </p:cTn>
+                        </p:par>
+                      </p:childTnLst>
+                    </p:cTn>
+                  </p:par>
+                  <p:par>
+                    <p:cTn id="26" fill="hold">
+                      <p:stCondLst>
+                        <p:cond delay="indefinite"/>
+                      </p:stCondLst>
+                      <p:childTnLst>
+                        <p:par>
+                          <p:cTn id="27" fill="hold">
+                            <p:stCondLst>
+                              <p:cond delay="0"/>
+                            </p:stCondLst>
+                            <p:childTnLst>
+                              <p:par>
+                                <p:cTn id="28" presetID="10" presetClass="entr" presetSubtype="0" fill="hold" nodeType="clickEffect">
+                                  <p:stCondLst>
+                                    <p:cond delay="0"/>
+                                  </p:stCondLst>
+                                  <p:childTnLst>
+                                    <p:set>
+                                      <p:cBhvr>
+                                        <p:cTn id="29" dur="1" fill="hold">
+                                          <p:stCondLst>
+                                            <p:cond delay="0"/>
+                                          </p:stCondLst>
+                                        </p:cTn>
+                                        <p:tgtEl>
+                                          <p:spTgt spid="6"/>
+                                        </p:tgtEl>
+                                        <p:attrNameLst>
+                                          <p:attrName>style.visibility</p:attrName>
+                                        </p:attrNameLst>
+                                      </p:cBhvr>
+                                      <p:to>
+                                        <p:strVal val="visible"/>
+                                      </p:to>
+                                    </p:set>
+                                    <p:animEffect transition="in" filter="fade">
+                                      <p:cBhvr>
+                                        <p:cTn id="30" dur="500"/>
+                                        <p:tgtEl>
+                                          <p:spTgt spid="6"/>
+                                        </p:tgtEl>
+                                      </p:cBhvr>
+                                    </p:animEffect>
+                                  </p:childTnLst>
+                                </p:cTn>
+                              </p:par>
+                            </p:childTnLst>
+                          </p:cTn>
+                        </p:par>
+                      </p:childTnLst>
+                    </p:cTn>
+                  </p:par>
+                </p:childTnLst>
+              </p:cTn>
+              <p:prevCondLst>
+                <p:cond evt="onPrev" delay="0">
+                  <p:tgtEl>
+                    <p:sldTgt/>
+                  </p:tgtEl>
+                </p:cond>
+              </p:prevCondLst>
+              <p:nextCondLst>
+                <p:cond evt="onNext" delay="0">
+                  <p:tgtEl>
+                    <p:sldTgt/>
+                  </p:tgtEl>
+                </p:cond>
+              </p:nextCondLst>
+            </p:seq>
+          </p:childTnLst>
+        </p:cTn>
       </p:par>
     </p:tnLst>
   </p:timing>

</xml_diff>